<commit_message>
udah d tambah-tambahin lagi nury
</commit_message>
<xml_diff>
--- a/Tubes/power point Aplikasi Do’a Sehari-hari.pptx
+++ b/Tubes/power point Aplikasi Do’a Sehari-hari.pptx
@@ -6,14 +6,15 @@
   </p:sldMasterIdLst>
   <p:sldIdLst>
     <p:sldId id="256" r:id="rId2"/>
-    <p:sldId id="257" r:id="rId3"/>
-    <p:sldId id="258" r:id="rId4"/>
-    <p:sldId id="259" r:id="rId5"/>
-    <p:sldId id="260" r:id="rId6"/>
-    <p:sldId id="261" r:id="rId7"/>
-    <p:sldId id="262" r:id="rId8"/>
-    <p:sldId id="263" r:id="rId9"/>
-    <p:sldId id="264" r:id="rId10"/>
+    <p:sldId id="265" r:id="rId3"/>
+    <p:sldId id="257" r:id="rId4"/>
+    <p:sldId id="258" r:id="rId5"/>
+    <p:sldId id="259" r:id="rId6"/>
+    <p:sldId id="260" r:id="rId7"/>
+    <p:sldId id="261" r:id="rId8"/>
+    <p:sldId id="262" r:id="rId9"/>
+    <p:sldId id="263" r:id="rId10"/>
+    <p:sldId id="264" r:id="rId11"/>
   </p:sldIdLst>
   <p:sldSz cx="9144000" cy="6858000" type="screen4x3"/>
   <p:notesSz cx="6858000" cy="9144000"/>
@@ -405,7 +406,7 @@
           <a:p>
             <a:fld id="{A60A26CE-EAEE-48AF-89BC-B53421A66DA9}" type="datetimeFigureOut">
               <a:rPr lang="id-ID" smtClean="0"/>
-              <a:t>26/10/2014</a:t>
+              <a:t>27/10/2014</a:t>
             </a:fld>
             <a:endParaRPr lang="id-ID"/>
           </a:p>
@@ -570,7 +571,7 @@
           <a:p>
             <a:fld id="{A60A26CE-EAEE-48AF-89BC-B53421A66DA9}" type="datetimeFigureOut">
               <a:rPr lang="id-ID" smtClean="0"/>
-              <a:t>26/10/2014</a:t>
+              <a:t>27/10/2014</a:t>
             </a:fld>
             <a:endParaRPr lang="id-ID"/>
           </a:p>
@@ -745,7 +746,7 @@
           <a:p>
             <a:fld id="{A60A26CE-EAEE-48AF-89BC-B53421A66DA9}" type="datetimeFigureOut">
               <a:rPr lang="id-ID" smtClean="0"/>
-              <a:t>26/10/2014</a:t>
+              <a:t>27/10/2014</a:t>
             </a:fld>
             <a:endParaRPr lang="id-ID"/>
           </a:p>
@@ -892,7 +893,7 @@
           <a:p>
             <a:fld id="{A60A26CE-EAEE-48AF-89BC-B53421A66DA9}" type="datetimeFigureOut">
               <a:rPr lang="id-ID" smtClean="0"/>
-              <a:t>26/10/2014</a:t>
+              <a:t>27/10/2014</a:t>
             </a:fld>
             <a:endParaRPr lang="id-ID"/>
           </a:p>
@@ -1009,7 +1010,7 @@
           <a:p>
             <a:fld id="{A60A26CE-EAEE-48AF-89BC-B53421A66DA9}" type="datetimeFigureOut">
               <a:rPr lang="id-ID" smtClean="0"/>
-              <a:t>26/10/2014</a:t>
+              <a:t>27/10/2014</a:t>
             </a:fld>
             <a:endParaRPr lang="id-ID"/>
           </a:p>
@@ -1279,7 +1280,7 @@
           <a:p>
             <a:fld id="{A60A26CE-EAEE-48AF-89BC-B53421A66DA9}" type="datetimeFigureOut">
               <a:rPr lang="id-ID" smtClean="0"/>
-              <a:t>26/10/2014</a:t>
+              <a:t>27/10/2014</a:t>
             </a:fld>
             <a:endParaRPr lang="id-ID"/>
           </a:p>
@@ -1548,7 +1549,7 @@
           <a:p>
             <a:fld id="{A60A26CE-EAEE-48AF-89BC-B53421A66DA9}" type="datetimeFigureOut">
               <a:rPr lang="id-ID" smtClean="0"/>
-              <a:t>26/10/2014</a:t>
+              <a:t>27/10/2014</a:t>
             </a:fld>
             <a:endParaRPr lang="id-ID"/>
           </a:p>
@@ -1995,7 +1996,7 @@
           <a:p>
             <a:fld id="{A60A26CE-EAEE-48AF-89BC-B53421A66DA9}" type="datetimeFigureOut">
               <a:rPr lang="id-ID" smtClean="0"/>
-              <a:t>26/10/2014</a:t>
+              <a:t>27/10/2014</a:t>
             </a:fld>
             <a:endParaRPr lang="id-ID"/>
           </a:p>
@@ -2108,7 +2109,7 @@
           <a:p>
             <a:fld id="{A60A26CE-EAEE-48AF-89BC-B53421A66DA9}" type="datetimeFigureOut">
               <a:rPr lang="id-ID" smtClean="0"/>
-              <a:t>26/10/2014</a:t>
+              <a:t>27/10/2014</a:t>
             </a:fld>
             <a:endParaRPr lang="id-ID"/>
           </a:p>
@@ -2358,7 +2359,7 @@
           <a:p>
             <a:fld id="{A60A26CE-EAEE-48AF-89BC-B53421A66DA9}" type="datetimeFigureOut">
               <a:rPr lang="id-ID" smtClean="0"/>
-              <a:t>26/10/2014</a:t>
+              <a:t>27/10/2014</a:t>
             </a:fld>
             <a:endParaRPr lang="id-ID"/>
           </a:p>
@@ -2598,7 +2599,7 @@
           <a:p>
             <a:fld id="{A60A26CE-EAEE-48AF-89BC-B53421A66DA9}" type="datetimeFigureOut">
               <a:rPr lang="id-ID" smtClean="0"/>
-              <a:t>26/10/2014</a:t>
+              <a:t>27/10/2014</a:t>
             </a:fld>
             <a:endParaRPr lang="id-ID"/>
           </a:p>
@@ -2771,7 +2772,7 @@
           <a:p>
             <a:fld id="{A60A26CE-EAEE-48AF-89BC-B53421A66DA9}" type="datetimeFigureOut">
               <a:rPr lang="id-ID" smtClean="0"/>
-              <a:t>26/10/2014</a:t>
+              <a:t>27/10/2014</a:t>
             </a:fld>
             <a:endParaRPr lang="id-ID"/>
           </a:p>
@@ -3345,7 +3346,237 @@
 </p:sld>
 </file>
 
+<file path=ppt/slides/slide10.xml><?xml version="1.0" encoding="utf-8"?>
+<p:sld xmlns:a="http://schemas.openxmlformats.org/drawingml/2006/main" xmlns:r="http://schemas.openxmlformats.org/officeDocument/2006/relationships" xmlns:p="http://schemas.openxmlformats.org/presentationml/2006/main">
+  <p:cSld>
+    <p:spTree>
+      <p:nvGrpSpPr>
+        <p:cNvPr id="1" name=""/>
+        <p:cNvGrpSpPr/>
+        <p:nvPr/>
+      </p:nvGrpSpPr>
+      <p:grpSpPr>
+        <a:xfrm>
+          <a:off x="0" y="0"/>
+          <a:ext cx="0" cy="0"/>
+          <a:chOff x="0" y="0"/>
+          <a:chExt cx="0" cy="0"/>
+        </a:xfrm>
+      </p:grpSpPr>
+      <p:sp>
+        <p:nvSpPr>
+          <p:cNvPr id="3" name="Title 2"/>
+          <p:cNvSpPr>
+            <a:spLocks noGrp="1"/>
+          </p:cNvSpPr>
+          <p:nvPr>
+            <p:ph type="title"/>
+          </p:nvPr>
+        </p:nvSpPr>
+        <p:spPr/>
+        <p:txBody>
+          <a:bodyPr/>
+          <a:lstStyle/>
+          <a:p>
+            <a:r>
+              <a:rPr lang="id-ID" dirty="0" smtClean="0"/>
+              <a:t>Mockup Aplikasi</a:t>
+            </a:r>
+            <a:endParaRPr lang="id-ID" dirty="0"/>
+          </a:p>
+        </p:txBody>
+      </p:sp>
+      <p:pic>
+        <p:nvPicPr>
+          <p:cNvPr id="4" name="Content Placeholder 3"/>
+          <p:cNvPicPr>
+            <a:picLocks noGrp="1"/>
+          </p:cNvPicPr>
+          <p:nvPr>
+            <p:ph idx="1"/>
+          </p:nvPr>
+        </p:nvPicPr>
+        <p:blipFill rotWithShape="1">
+          <a:blip r:embed="rId2"/>
+          <a:srcRect l="19426" t="29446" r="46959" b="27586"/>
+          <a:stretch/>
+        </p:blipFill>
+        <p:spPr bwMode="auto">
+          <a:xfrm>
+            <a:off x="428596" y="2143116"/>
+            <a:ext cx="4373698" cy="3143195"/>
+          </a:xfrm>
+          <a:prstGeom prst="rect">
+            <a:avLst/>
+          </a:prstGeom>
+          <a:ln>
+            <a:noFill/>
+          </a:ln>
+          <a:extLst>
+            <a:ext uri="{53640926-AAD7-44D8-BBD7-CCE9431645EC}">
+              <a14:shadowObscured xmlns:a14="http://schemas.microsoft.com/office/drawing/2010/main"/>
+            </a:ext>
+          </a:extLst>
+        </p:spPr>
+      </p:pic>
+      <p:pic>
+        <p:nvPicPr>
+          <p:cNvPr id="5" name="Picture 4"/>
+          <p:cNvPicPr/>
+          <p:nvPr/>
+        </p:nvPicPr>
+        <p:blipFill rotWithShape="1">
+          <a:blip r:embed="rId3"/>
+          <a:srcRect l="19595" t="28845" r="47297" b="27587"/>
+          <a:stretch/>
+        </p:blipFill>
+        <p:spPr bwMode="auto">
+          <a:xfrm>
+            <a:off x="4929190" y="2071678"/>
+            <a:ext cx="3929090" cy="3214710"/>
+          </a:xfrm>
+          <a:prstGeom prst="rect">
+            <a:avLst/>
+          </a:prstGeom>
+          <a:ln>
+            <a:noFill/>
+          </a:ln>
+          <a:extLst>
+            <a:ext uri="{53640926-AAD7-44D8-BBD7-CCE9431645EC}">
+              <a14:shadowObscured xmlns:a14="http://schemas.microsoft.com/office/drawing/2010/main"/>
+            </a:ext>
+          </a:extLst>
+        </p:spPr>
+      </p:pic>
+    </p:spTree>
+  </p:cSld>
+  <p:clrMapOvr>
+    <a:masterClrMapping/>
+  </p:clrMapOvr>
+  <p:transition>
+    <p:newsflash/>
+  </p:transition>
+  <p:timing>
+    <p:tnLst>
+      <p:par>
+        <p:cTn id="1" dur="indefinite" restart="never" nodeType="tmRoot"/>
+      </p:par>
+    </p:tnLst>
+  </p:timing>
+</p:sld>
+</file>
+
 <file path=ppt/slides/slide2.xml><?xml version="1.0" encoding="utf-8"?>
+<p:sld xmlns:a="http://schemas.openxmlformats.org/drawingml/2006/main" xmlns:r="http://schemas.openxmlformats.org/officeDocument/2006/relationships" xmlns:p="http://schemas.openxmlformats.org/presentationml/2006/main">
+  <p:cSld>
+    <p:spTree>
+      <p:nvGrpSpPr>
+        <p:cNvPr id="1" name=""/>
+        <p:cNvGrpSpPr/>
+        <p:nvPr/>
+      </p:nvGrpSpPr>
+      <p:grpSpPr>
+        <a:xfrm>
+          <a:off x="0" y="0"/>
+          <a:ext cx="0" cy="0"/>
+          <a:chOff x="0" y="0"/>
+          <a:chExt cx="0" cy="0"/>
+        </a:xfrm>
+      </p:grpSpPr>
+      <p:sp>
+        <p:nvSpPr>
+          <p:cNvPr id="2" name="Content Placeholder 1"/>
+          <p:cNvSpPr>
+            <a:spLocks noGrp="1"/>
+          </p:cNvSpPr>
+          <p:nvPr>
+            <p:ph idx="1"/>
+          </p:nvPr>
+        </p:nvSpPr>
+        <p:spPr/>
+        <p:txBody>
+          <a:bodyPr/>
+          <a:lstStyle/>
+          <a:p>
+            <a:pPr marL="0" indent="0">
+              <a:buNone/>
+            </a:pPr>
+            <a:r>
+              <a:rPr lang="id-ID" dirty="0" smtClean="0"/>
+              <a:t>Kehidupan </a:t>
+            </a:r>
+            <a:r>
+              <a:rPr lang="id-ID" dirty="0"/>
+              <a:t>manusia sekarang ini tidak dapat terlepas dari informasi, hal ini menjadi salah satu penyebab pentingnya keterlibatan bidang teknologi. Hasil pemanggilan ini akan di olah menjadi sebuah </a:t>
+            </a:r>
+            <a:r>
+              <a:rPr lang="id-ID" i="1" dirty="0"/>
+              <a:t>file </a:t>
+            </a:r>
+            <a:r>
+              <a:rPr lang="id-ID" dirty="0"/>
+              <a:t>keluaran (</a:t>
+            </a:r>
+            <a:r>
+              <a:rPr lang="id-ID" i="1" dirty="0"/>
+              <a:t>output</a:t>
+            </a:r>
+            <a:r>
+              <a:rPr lang="id-ID" dirty="0"/>
+              <a:t>) yang akan di tampilkan dalam bentuk gambar dan teks. Sehingga dengan digunakannya do’a-do’a sehari-hari yang sudah terkomputerisasi ini dapat meningkatkan pendapatan keimanan seseorang.</a:t>
+            </a:r>
+          </a:p>
+          <a:p>
+            <a:pPr marL="0" indent="0">
+              <a:buNone/>
+            </a:pPr>
+            <a:endParaRPr lang="id-ID" dirty="0"/>
+          </a:p>
+        </p:txBody>
+      </p:sp>
+      <p:sp>
+        <p:nvSpPr>
+          <p:cNvPr id="3" name="Title 2"/>
+          <p:cNvSpPr>
+            <a:spLocks noGrp="1"/>
+          </p:cNvSpPr>
+          <p:nvPr>
+            <p:ph type="title"/>
+          </p:nvPr>
+        </p:nvSpPr>
+        <p:spPr/>
+        <p:txBody>
+          <a:bodyPr>
+            <a:normAutofit fontScale="90000"/>
+          </a:bodyPr>
+          <a:lstStyle/>
+          <a:p>
+            <a:r>
+              <a:rPr lang="id-ID" b="1" dirty="0"/>
+              <a:t>Deskripsi Umum Perangkat </a:t>
+            </a:r>
+            <a:r>
+              <a:rPr lang="id-ID" b="1" dirty="0" smtClean="0"/>
+              <a:t>Lunak</a:t>
+            </a:r>
+            <a:endParaRPr lang="id-ID" dirty="0"/>
+          </a:p>
+        </p:txBody>
+      </p:sp>
+    </p:spTree>
+    <p:extLst>
+      <p:ext uri="{BB962C8B-B14F-4D97-AF65-F5344CB8AC3E}">
+        <p14:creationId xmlns:p14="http://schemas.microsoft.com/office/powerpoint/2010/main" val="3083918367"/>
+      </p:ext>
+    </p:extLst>
+  </p:cSld>
+  <p:clrMapOvr>
+    <a:masterClrMapping/>
+  </p:clrMapOvr>
+</p:sld>
+</file>
+
+<file path=ppt/slides/slide3.xml><?xml version="1.0" encoding="utf-8"?>
 <p:sld xmlns:a="http://schemas.openxmlformats.org/drawingml/2006/main" xmlns:r="http://schemas.openxmlformats.org/officeDocument/2006/relationships" xmlns:p="http://schemas.openxmlformats.org/presentationml/2006/main">
   <p:cSld>
     <p:spTree>
@@ -3413,7 +3644,7 @@
           </a:ln>
           <a:extLst>
             <a:ext uri="{53640926-AAD7-44D8-BBD7-CCE9431645EC}">
-              <a14:shadowObscured xmlns:ve="http://schemas.openxmlformats.org/markup-compatibility/2006" xmlns:m="http://schemas.openxmlformats.org/officeDocument/2006/math" xmlns:wp="http://schemas.openxmlformats.org/drawingml/2006/wordprocessingDrawing" xmlns:wne="http://schemas.microsoft.com/office/word/2006/wordml" xmlns:a14="http://schemas.microsoft.com/office/drawing/2010/main" xmlns:wps="http://schemas.microsoft.com/office/word/2010/wordprocessingShape" xmlns:wpi="http://schemas.microsoft.com/office/word/2010/wordprocessingInk" xmlns:wpg="http://schemas.microsoft.com/office/word/2010/wordprocessingGroup" xmlns:w14="http://schemas.microsoft.com/office/word/2010/wordml" xmlns:w="http://schemas.openxmlformats.org/wordprocessingml/2006/main" xmlns:w10="urn:schemas-microsoft-com:office:word" xmlns:wp14="http://schemas.microsoft.com/office/word/2010/wordprocessingDrawing" xmlns:v="urn:schemas-microsoft-com:vml" xmlns:o="urn:schemas-microsoft-com:office:office" xmlns:mc="http://schemas.openxmlformats.org/markup-compatibility/2006" xmlns:wpc="http://schemas.microsoft.com/office/word/2010/wordprocessingCanvas" xmlns="" xmlns:pic="http://schemas.openxmlformats.org/drawingml/2006/picture" xmlns:lc="http://schemas.openxmlformats.org/drawingml/2006/lockedCanvas"/>
+              <a14:shadowObscured xmlns:a14="http://schemas.microsoft.com/office/drawing/2010/main"/>
             </a:ext>
           </a:extLst>
         </p:spPr>
@@ -3436,7 +3667,7 @@
 </p:sld>
 </file>
 
-<file path=ppt/slides/slide3.xml><?xml version="1.0" encoding="utf-8"?>
+<file path=ppt/slides/slide4.xml><?xml version="1.0" encoding="utf-8"?>
 <p:sld xmlns:a="http://schemas.openxmlformats.org/drawingml/2006/main" xmlns:r="http://schemas.openxmlformats.org/officeDocument/2006/relationships" xmlns:p="http://schemas.openxmlformats.org/presentationml/2006/main">
   <p:cSld>
     <p:spTree>
@@ -3528,7 +3759,7 @@
 </p:sld>
 </file>
 
-<file path=ppt/slides/slide4.xml><?xml version="1.0" encoding="utf-8"?>
+<file path=ppt/slides/slide5.xml><?xml version="1.0" encoding="utf-8"?>
 <p:sld xmlns:a="http://schemas.openxmlformats.org/drawingml/2006/main" xmlns:r="http://schemas.openxmlformats.org/officeDocument/2006/relationships" xmlns:p="http://schemas.openxmlformats.org/presentationml/2006/main">
   <p:cSld>
     <p:spTree>
@@ -3620,7 +3851,7 @@
 </p:sld>
 </file>
 
-<file path=ppt/slides/slide5.xml><?xml version="1.0" encoding="utf-8"?>
+<file path=ppt/slides/slide6.xml><?xml version="1.0" encoding="utf-8"?>
 <p:sld xmlns:a="http://schemas.openxmlformats.org/drawingml/2006/main" xmlns:r="http://schemas.openxmlformats.org/officeDocument/2006/relationships" xmlns:p="http://schemas.openxmlformats.org/presentationml/2006/main">
   <p:cSld>
     <p:spTree>
@@ -3713,7 +3944,7 @@
 </p:sld>
 </file>
 
-<file path=ppt/slides/slide6.xml><?xml version="1.0" encoding="utf-8"?>
+<file path=ppt/slides/slide7.xml><?xml version="1.0" encoding="utf-8"?>
 <p:sld xmlns:a="http://schemas.openxmlformats.org/drawingml/2006/main" xmlns:r="http://schemas.openxmlformats.org/officeDocument/2006/relationships" xmlns:p="http://schemas.openxmlformats.org/presentationml/2006/main">
   <p:cSld>
     <p:spTree>
@@ -3805,7 +4036,7 @@
 </p:sld>
 </file>
 
-<file path=ppt/slides/slide7.xml><?xml version="1.0" encoding="utf-8"?>
+<file path=ppt/slides/slide8.xml><?xml version="1.0" encoding="utf-8"?>
 <p:sld xmlns:a="http://schemas.openxmlformats.org/drawingml/2006/main" xmlns:r="http://schemas.openxmlformats.org/officeDocument/2006/relationships" xmlns:p="http://schemas.openxmlformats.org/presentationml/2006/main">
   <p:cSld>
     <p:spTree>
@@ -3898,7 +4129,7 @@
 </p:sld>
 </file>
 
-<file path=ppt/slides/slide8.xml><?xml version="1.0" encoding="utf-8"?>
+<file path=ppt/slides/slide9.xml><?xml version="1.0" encoding="utf-8"?>
 <p:sld xmlns:a="http://schemas.openxmlformats.org/drawingml/2006/main" xmlns:r="http://schemas.openxmlformats.org/officeDocument/2006/relationships" xmlns:p="http://schemas.openxmlformats.org/presentationml/2006/main">
   <p:cSld>
     <p:spTree>
@@ -3980,126 +4211,6 @@
   </p:clrMapOvr>
   <p:transition>
     <p:blinds/>
-  </p:transition>
-  <p:timing>
-    <p:tnLst>
-      <p:par>
-        <p:cTn id="1" dur="indefinite" restart="never" nodeType="tmRoot"/>
-      </p:par>
-    </p:tnLst>
-  </p:timing>
-</p:sld>
-</file>
-
-<file path=ppt/slides/slide9.xml><?xml version="1.0" encoding="utf-8"?>
-<p:sld xmlns:a="http://schemas.openxmlformats.org/drawingml/2006/main" xmlns:r="http://schemas.openxmlformats.org/officeDocument/2006/relationships" xmlns:p="http://schemas.openxmlformats.org/presentationml/2006/main">
-  <p:cSld>
-    <p:spTree>
-      <p:nvGrpSpPr>
-        <p:cNvPr id="1" name=""/>
-        <p:cNvGrpSpPr/>
-        <p:nvPr/>
-      </p:nvGrpSpPr>
-      <p:grpSpPr>
-        <a:xfrm>
-          <a:off x="0" y="0"/>
-          <a:ext cx="0" cy="0"/>
-          <a:chOff x="0" y="0"/>
-          <a:chExt cx="0" cy="0"/>
-        </a:xfrm>
-      </p:grpSpPr>
-      <p:sp>
-        <p:nvSpPr>
-          <p:cNvPr id="3" name="Title 2"/>
-          <p:cNvSpPr>
-            <a:spLocks noGrp="1"/>
-          </p:cNvSpPr>
-          <p:nvPr>
-            <p:ph type="title"/>
-          </p:nvPr>
-        </p:nvSpPr>
-        <p:spPr/>
-        <p:txBody>
-          <a:bodyPr/>
-          <a:lstStyle/>
-          <a:p>
-            <a:r>
-              <a:rPr lang="id-ID" dirty="0" smtClean="0"/>
-              <a:t>Mockup Aplikasi</a:t>
-            </a:r>
-            <a:endParaRPr lang="id-ID" dirty="0"/>
-          </a:p>
-        </p:txBody>
-      </p:sp>
-      <p:pic>
-        <p:nvPicPr>
-          <p:cNvPr id="4" name="Content Placeholder 3"/>
-          <p:cNvPicPr>
-            <a:picLocks noGrp="1"/>
-          </p:cNvPicPr>
-          <p:nvPr>
-            <p:ph idx="1"/>
-          </p:nvPr>
-        </p:nvPicPr>
-        <p:blipFill rotWithShape="1">
-          <a:blip r:embed="rId2"/>
-          <a:srcRect l="19426" t="29446" r="46959" b="27586"/>
-          <a:stretch/>
-        </p:blipFill>
-        <p:spPr bwMode="auto">
-          <a:xfrm>
-            <a:off x="428596" y="2143116"/>
-            <a:ext cx="4373698" cy="3143195"/>
-          </a:xfrm>
-          <a:prstGeom prst="rect">
-            <a:avLst/>
-          </a:prstGeom>
-          <a:ln>
-            <a:noFill/>
-          </a:ln>
-          <a:extLst>
-            <a:ext uri="{53640926-AAD7-44D8-BBD7-CCE9431645EC}">
-              <a14:shadowObscured xmlns:ve="http://schemas.openxmlformats.org/markup-compatibility/2006" xmlns:m="http://schemas.openxmlformats.org/officeDocument/2006/math" xmlns:wp="http://schemas.openxmlformats.org/drawingml/2006/wordprocessingDrawing" xmlns:wne="http://schemas.microsoft.com/office/word/2006/wordml" xmlns:a14="http://schemas.microsoft.com/office/drawing/2010/main" xmlns:wps="http://schemas.microsoft.com/office/word/2010/wordprocessingShape" xmlns:wpi="http://schemas.microsoft.com/office/word/2010/wordprocessingInk" xmlns:wpg="http://schemas.microsoft.com/office/word/2010/wordprocessingGroup" xmlns:w14="http://schemas.microsoft.com/office/word/2010/wordml" xmlns:w="http://schemas.openxmlformats.org/wordprocessingml/2006/main" xmlns:w10="urn:schemas-microsoft-com:office:word" xmlns:wp14="http://schemas.microsoft.com/office/word/2010/wordprocessingDrawing" xmlns:v="urn:schemas-microsoft-com:vml" xmlns:o="urn:schemas-microsoft-com:office:office" xmlns:mc="http://schemas.openxmlformats.org/markup-compatibility/2006" xmlns:wpc="http://schemas.microsoft.com/office/word/2010/wordprocessingCanvas" xmlns="" xmlns:pic="http://schemas.openxmlformats.org/drawingml/2006/picture" xmlns:lc="http://schemas.openxmlformats.org/drawingml/2006/lockedCanvas"/>
-            </a:ext>
-          </a:extLst>
-        </p:spPr>
-      </p:pic>
-      <p:pic>
-        <p:nvPicPr>
-          <p:cNvPr id="5" name="Picture 4"/>
-          <p:cNvPicPr/>
-          <p:nvPr/>
-        </p:nvPicPr>
-        <p:blipFill rotWithShape="1">
-          <a:blip r:embed="rId3"/>
-          <a:srcRect l="19595" t="28845" r="47297" b="27587"/>
-          <a:stretch/>
-        </p:blipFill>
-        <p:spPr bwMode="auto">
-          <a:xfrm>
-            <a:off x="4929190" y="2071678"/>
-            <a:ext cx="3929090" cy="3214710"/>
-          </a:xfrm>
-          <a:prstGeom prst="rect">
-            <a:avLst/>
-          </a:prstGeom>
-          <a:ln>
-            <a:noFill/>
-          </a:ln>
-          <a:extLst>
-            <a:ext uri="{53640926-AAD7-44D8-BBD7-CCE9431645EC}">
-              <a14:shadowObscured xmlns:ve="http://schemas.openxmlformats.org/markup-compatibility/2006" xmlns:m="http://schemas.openxmlformats.org/officeDocument/2006/math" xmlns:wp="http://schemas.openxmlformats.org/drawingml/2006/wordprocessingDrawing" xmlns:wne="http://schemas.microsoft.com/office/word/2006/wordml" xmlns:a14="http://schemas.microsoft.com/office/drawing/2010/main" xmlns:wps="http://schemas.microsoft.com/office/word/2010/wordprocessingShape" xmlns:wpi="http://schemas.microsoft.com/office/word/2010/wordprocessingInk" xmlns:wpg="http://schemas.microsoft.com/office/word/2010/wordprocessingGroup" xmlns:w14="http://schemas.microsoft.com/office/word/2010/wordml" xmlns:w="http://schemas.openxmlformats.org/wordprocessingml/2006/main" xmlns:w10="urn:schemas-microsoft-com:office:word" xmlns:wp14="http://schemas.microsoft.com/office/word/2010/wordprocessingDrawing" xmlns:v="urn:schemas-microsoft-com:vml" xmlns:o="urn:schemas-microsoft-com:office:office" xmlns:mc="http://schemas.openxmlformats.org/markup-compatibility/2006" xmlns:wpc="http://schemas.microsoft.com/office/word/2010/wordprocessingCanvas" xmlns="" xmlns:pic="http://schemas.openxmlformats.org/drawingml/2006/picture" xmlns:lc="http://schemas.openxmlformats.org/drawingml/2006/lockedCanvas"/>
-            </a:ext>
-          </a:extLst>
-        </p:spPr>
-      </p:pic>
-    </p:spTree>
-  </p:cSld>
-  <p:clrMapOvr>
-    <a:masterClrMapping/>
-  </p:clrMapOvr>
-  <p:transition>
-    <p:newsflash/>
   </p:transition>
   <p:timing>
     <p:tnLst>

</xml_diff>

<commit_message>
udah di edit lagi nury sma aku
</commit_message>
<xml_diff>
--- a/Tubes/power point Aplikasi Do’a Sehari-hari.pptx
+++ b/Tubes/power point Aplikasi Do’a Sehari-hari.pptx
@@ -3498,12 +3498,12 @@
           <a:bodyPr/>
           <a:lstStyle/>
           <a:p>
-            <a:pPr marL="0" indent="0">
+            <a:pPr marL="0" indent="0" algn="just">
               <a:buNone/>
             </a:pPr>
             <a:r>
-              <a:rPr lang="id-ID" dirty="0" smtClean="0"/>
-              <a:t>Kehidupan </a:t>
+              <a:rPr lang="id-ID" smtClean="0"/>
+              <a:t>	Kehidupan </a:t>
             </a:r>
             <a:r>
               <a:rPr lang="id-ID" dirty="0"/>
@@ -3527,7 +3527,7 @@
             </a:r>
           </a:p>
           <a:p>
-            <a:pPr marL="0" indent="0">
+            <a:pPr marL="0" indent="0" algn="just">
               <a:buNone/>
             </a:pPr>
             <a:endParaRPr lang="id-ID" dirty="0"/>

</xml_diff>